<commit_message>
changes image serving to b64 strings - due to complications in configuring API gateway to render binary files
</commit_message>
<xml_diff>
--- a/graphics.pptx
+++ b/graphics.pptx
@@ -109,6 +109,11 @@
       </a:defRPr>
     </a:lvl9pPr>
   </p:defaultTextStyle>
+  <p:extLst>
+    <p:ext uri="{EFAFB233-063F-42B5-8137-9DF3F51BA10A}">
+      <p15:sldGuideLst xmlns:p15="http://schemas.microsoft.com/office/powerpoint/2012/main"/>
+    </p:ext>
+  </p:extLst>
 </p:presentation>
 </file>
 
@@ -194,7 +199,7 @@
           <a:p>
             <a:fld id="{6C76CFF4-2948-0547-AFB4-6ADDECDCB85E}" type="datetimeFigureOut">
               <a:rPr lang="en-US" smtClean="0"/>
-              <a:t>10/5/21</a:t>
+              <a:t>10/11/21</a:t>
             </a:fld>
             <a:endParaRPr lang="en-US"/>
           </a:p>
@@ -759,7 +764,7 @@
           <a:p>
             <a:fld id="{E86CA716-4487-0A44-A078-5EC6A25390E0}" type="datetimeFigureOut">
               <a:rPr lang="en-US" smtClean="0"/>
-              <a:t>10/5/21</a:t>
+              <a:t>10/11/21</a:t>
             </a:fld>
             <a:endParaRPr lang="en-US"/>
           </a:p>
@@ -957,7 +962,7 @@
           <a:p>
             <a:fld id="{E86CA716-4487-0A44-A078-5EC6A25390E0}" type="datetimeFigureOut">
               <a:rPr lang="en-US" smtClean="0"/>
-              <a:t>10/5/21</a:t>
+              <a:t>10/11/21</a:t>
             </a:fld>
             <a:endParaRPr lang="en-US"/>
           </a:p>
@@ -1165,7 +1170,7 @@
           <a:p>
             <a:fld id="{E86CA716-4487-0A44-A078-5EC6A25390E0}" type="datetimeFigureOut">
               <a:rPr lang="en-US" smtClean="0"/>
-              <a:t>10/5/21</a:t>
+              <a:t>10/11/21</a:t>
             </a:fld>
             <a:endParaRPr lang="en-US"/>
           </a:p>
@@ -1363,7 +1368,7 @@
           <a:p>
             <a:fld id="{E86CA716-4487-0A44-A078-5EC6A25390E0}" type="datetimeFigureOut">
               <a:rPr lang="en-US" smtClean="0"/>
-              <a:t>10/5/21</a:t>
+              <a:t>10/11/21</a:t>
             </a:fld>
             <a:endParaRPr lang="en-US"/>
           </a:p>
@@ -1638,7 +1643,7 @@
           <a:p>
             <a:fld id="{E86CA716-4487-0A44-A078-5EC6A25390E0}" type="datetimeFigureOut">
               <a:rPr lang="en-US" smtClean="0"/>
-              <a:t>10/5/21</a:t>
+              <a:t>10/11/21</a:t>
             </a:fld>
             <a:endParaRPr lang="en-US"/>
           </a:p>
@@ -1903,7 +1908,7 @@
           <a:p>
             <a:fld id="{E86CA716-4487-0A44-A078-5EC6A25390E0}" type="datetimeFigureOut">
               <a:rPr lang="en-US" smtClean="0"/>
-              <a:t>10/5/21</a:t>
+              <a:t>10/11/21</a:t>
             </a:fld>
             <a:endParaRPr lang="en-US"/>
           </a:p>
@@ -2315,7 +2320,7 @@
           <a:p>
             <a:fld id="{E86CA716-4487-0A44-A078-5EC6A25390E0}" type="datetimeFigureOut">
               <a:rPr lang="en-US" smtClean="0"/>
-              <a:t>10/5/21</a:t>
+              <a:t>10/11/21</a:t>
             </a:fld>
             <a:endParaRPr lang="en-US"/>
           </a:p>
@@ -2456,7 +2461,7 @@
           <a:p>
             <a:fld id="{E86CA716-4487-0A44-A078-5EC6A25390E0}" type="datetimeFigureOut">
               <a:rPr lang="en-US" smtClean="0"/>
-              <a:t>10/5/21</a:t>
+              <a:t>10/11/21</a:t>
             </a:fld>
             <a:endParaRPr lang="en-US"/>
           </a:p>
@@ -2569,7 +2574,7 @@
           <a:p>
             <a:fld id="{E86CA716-4487-0A44-A078-5EC6A25390E0}" type="datetimeFigureOut">
               <a:rPr lang="en-US" smtClean="0"/>
-              <a:t>10/5/21</a:t>
+              <a:t>10/11/21</a:t>
             </a:fld>
             <a:endParaRPr lang="en-US"/>
           </a:p>
@@ -2880,7 +2885,7 @@
           <a:p>
             <a:fld id="{E86CA716-4487-0A44-A078-5EC6A25390E0}" type="datetimeFigureOut">
               <a:rPr lang="en-US" smtClean="0"/>
-              <a:t>10/5/21</a:t>
+              <a:t>10/11/21</a:t>
             </a:fld>
             <a:endParaRPr lang="en-US"/>
           </a:p>
@@ -3168,7 +3173,7 @@
           <a:p>
             <a:fld id="{E86CA716-4487-0A44-A078-5EC6A25390E0}" type="datetimeFigureOut">
               <a:rPr lang="en-US" smtClean="0"/>
-              <a:t>10/5/21</a:t>
+              <a:t>10/11/21</a:t>
             </a:fld>
             <a:endParaRPr lang="en-US"/>
           </a:p>
@@ -3409,7 +3414,7 @@
           <a:p>
             <a:fld id="{E86CA716-4487-0A44-A078-5EC6A25390E0}" type="datetimeFigureOut">
               <a:rPr lang="en-US" smtClean="0"/>
-              <a:t>10/5/21</a:t>
+              <a:t>10/11/21</a:t>
             </a:fld>
             <a:endParaRPr lang="en-US"/>
           </a:p>
@@ -4347,7 +4352,7 @@
         </p:nvSpPr>
         <p:spPr>
           <a:xfrm>
-            <a:off x="7438768" y="1825625"/>
+            <a:off x="1747831" y="105109"/>
             <a:ext cx="3915032" cy="645726"/>
           </a:xfrm>
         </p:spPr>
@@ -4365,6 +4370,256 @@
                 <a:cs typeface="APPLE CHANCERY" panose="03020702040506060504" pitchFamily="66" charset="-79"/>
               </a:rPr>
               <a:t>Donut or Not?</a:t>
+            </a:r>
+          </a:p>
+        </p:txBody>
+      </p:sp>
+      <p:sp>
+        <p:nvSpPr>
+          <p:cNvPr id="2" name="TextBox 1">
+            <a:extLst>
+              <a:ext uri="{FF2B5EF4-FFF2-40B4-BE49-F238E27FC236}">
+                <a16:creationId xmlns:a16="http://schemas.microsoft.com/office/drawing/2014/main" id="{7D5A0F4C-72E2-0A47-8BB1-DF31F89371C3}"/>
+              </a:ext>
+            </a:extLst>
+          </p:cNvPr>
+          <p:cNvSpPr txBox="1"/>
+          <p:nvPr/>
+        </p:nvSpPr>
+        <p:spPr>
+          <a:xfrm>
+            <a:off x="3479131" y="1921475"/>
+            <a:ext cx="5233737" cy="369332"/>
+          </a:xfrm>
+          <a:prstGeom prst="rect">
+            <a:avLst/>
+          </a:prstGeom>
+          <a:noFill/>
+          <a:ln>
+            <a:solidFill>
+              <a:schemeClr val="accent1"/>
+            </a:solidFill>
+          </a:ln>
+        </p:spPr>
+        <p:txBody>
+          <a:bodyPr wrap="square" rtlCol="0">
+            <a:spAutoFit/>
+          </a:bodyPr>
+          <a:lstStyle/>
+          <a:p>
+            <a:pPr algn="ctr"/>
+            <a:r>
+              <a:rPr lang="en-US" dirty="0"/>
+              <a:t>AWS API gateway</a:t>
+            </a:r>
+          </a:p>
+        </p:txBody>
+      </p:sp>
+      <p:pic>
+        <p:nvPicPr>
+          <p:cNvPr id="1026" name="Picture 2" descr="aws-api-gateway-icon - Quantilus">
+            <a:extLst>
+              <a:ext uri="{FF2B5EF4-FFF2-40B4-BE49-F238E27FC236}">
+                <a16:creationId xmlns:a16="http://schemas.microsoft.com/office/drawing/2014/main" id="{4448139B-0401-484C-A6A1-7F2598AC6E66}"/>
+              </a:ext>
+            </a:extLst>
+          </p:cNvPr>
+          <p:cNvPicPr>
+            <a:picLocks noChangeAspect="1" noChangeArrowheads="1"/>
+          </p:cNvPicPr>
+          <p:nvPr/>
+        </p:nvPicPr>
+        <p:blipFill>
+          <a:blip r:embed="rId2">
+            <a:extLst>
+              <a:ext uri="{28A0092B-C50C-407E-A947-70E740481C1C}">
+                <a14:useLocalDpi xmlns:a14="http://schemas.microsoft.com/office/drawing/2010/main" val="0"/>
+              </a:ext>
+            </a:extLst>
+          </a:blip>
+          <a:srcRect/>
+          <a:stretch>
+            <a:fillRect/>
+          </a:stretch>
+        </p:blipFill>
+        <p:spPr bwMode="auto">
+          <a:xfrm>
+            <a:off x="2785950" y="1840210"/>
+            <a:ext cx="576135" cy="576135"/>
+          </a:xfrm>
+          <a:prstGeom prst="rect">
+            <a:avLst/>
+          </a:prstGeom>
+          <a:noFill/>
+          <a:extLst>
+            <a:ext uri="{909E8E84-426E-40DD-AFC4-6F175D3DCCD1}">
+              <a14:hiddenFill xmlns:a14="http://schemas.microsoft.com/office/drawing/2010/main">
+                <a:solidFill>
+                  <a:srgbClr val="FFFFFF"/>
+                </a:solidFill>
+              </a14:hiddenFill>
+            </a:ext>
+          </a:extLst>
+        </p:spPr>
+      </p:pic>
+      <p:cxnSp>
+        <p:nvCxnSpPr>
+          <p:cNvPr id="6" name="Straight Arrow Connector 5">
+            <a:extLst>
+              <a:ext uri="{FF2B5EF4-FFF2-40B4-BE49-F238E27FC236}">
+                <a16:creationId xmlns:a16="http://schemas.microsoft.com/office/drawing/2014/main" id="{497D8A68-3746-5D40-BDE0-73DC656CD059}"/>
+              </a:ext>
+            </a:extLst>
+          </p:cNvPr>
+          <p:cNvCxnSpPr/>
+          <p:nvPr/>
+        </p:nvCxnSpPr>
+        <p:spPr>
+          <a:xfrm>
+            <a:off x="5811143" y="1099751"/>
+            <a:ext cx="0" cy="740459"/>
+          </a:xfrm>
+          <a:prstGeom prst="straightConnector1">
+            <a:avLst/>
+          </a:prstGeom>
+          <a:ln>
+            <a:tailEnd type="triangle"/>
+          </a:ln>
+        </p:spPr>
+        <p:style>
+          <a:lnRef idx="1">
+            <a:schemeClr val="accent1"/>
+          </a:lnRef>
+          <a:fillRef idx="0">
+            <a:schemeClr val="accent1"/>
+          </a:fillRef>
+          <a:effectRef idx="0">
+            <a:schemeClr val="accent1"/>
+          </a:effectRef>
+          <a:fontRef idx="minor">
+            <a:schemeClr val="tx1"/>
+          </a:fontRef>
+        </p:style>
+      </p:cxnSp>
+      <p:sp>
+        <p:nvSpPr>
+          <p:cNvPr id="8" name="TextBox 7">
+            <a:extLst>
+              <a:ext uri="{FF2B5EF4-FFF2-40B4-BE49-F238E27FC236}">
+                <a16:creationId xmlns:a16="http://schemas.microsoft.com/office/drawing/2014/main" id="{82738073-88D5-1945-A1CD-FADA89656EDA}"/>
+              </a:ext>
+            </a:extLst>
+          </p:cNvPr>
+          <p:cNvSpPr txBox="1"/>
+          <p:nvPr/>
+        </p:nvSpPr>
+        <p:spPr>
+          <a:xfrm>
+            <a:off x="5004134" y="566169"/>
+            <a:ext cx="2183729" cy="369332"/>
+          </a:xfrm>
+          <a:prstGeom prst="rect">
+            <a:avLst/>
+          </a:prstGeom>
+          <a:noFill/>
+          <a:ln>
+            <a:solidFill>
+              <a:schemeClr val="accent1"/>
+            </a:solidFill>
+          </a:ln>
+        </p:spPr>
+        <p:txBody>
+          <a:bodyPr wrap="square" rtlCol="0">
+            <a:spAutoFit/>
+          </a:bodyPr>
+          <a:lstStyle/>
+          <a:p>
+            <a:pPr algn="ctr"/>
+            <a:r>
+              <a:rPr lang="en-US" dirty="0"/>
+              <a:t>User </a:t>
+            </a:r>
+          </a:p>
+        </p:txBody>
+      </p:sp>
+      <p:cxnSp>
+        <p:nvCxnSpPr>
+          <p:cNvPr id="9" name="Straight Arrow Connector 8">
+            <a:extLst>
+              <a:ext uri="{FF2B5EF4-FFF2-40B4-BE49-F238E27FC236}">
+                <a16:creationId xmlns:a16="http://schemas.microsoft.com/office/drawing/2014/main" id="{0A6A3CA6-F8DE-1141-A48A-097AEF8CE141}"/>
+              </a:ext>
+            </a:extLst>
+          </p:cNvPr>
+          <p:cNvCxnSpPr>
+            <a:cxnSpLocks/>
+          </p:cNvCxnSpPr>
+          <p:nvPr/>
+        </p:nvCxnSpPr>
+        <p:spPr>
+          <a:xfrm flipV="1">
+            <a:off x="6367847" y="1099751"/>
+            <a:ext cx="0" cy="750590"/>
+          </a:xfrm>
+          <a:prstGeom prst="straightConnector1">
+            <a:avLst/>
+          </a:prstGeom>
+          <a:ln>
+            <a:tailEnd type="triangle"/>
+          </a:ln>
+        </p:spPr>
+        <p:style>
+          <a:lnRef idx="1">
+            <a:schemeClr val="accent1"/>
+          </a:lnRef>
+          <a:fillRef idx="0">
+            <a:schemeClr val="accent1"/>
+          </a:fillRef>
+          <a:effectRef idx="0">
+            <a:schemeClr val="accent1"/>
+          </a:effectRef>
+          <a:fontRef idx="minor">
+            <a:schemeClr val="tx1"/>
+          </a:fontRef>
+        </p:style>
+      </p:cxnSp>
+      <p:sp>
+        <p:nvSpPr>
+          <p:cNvPr id="11" name="TextBox 10">
+            <a:extLst>
+              <a:ext uri="{FF2B5EF4-FFF2-40B4-BE49-F238E27FC236}">
+                <a16:creationId xmlns:a16="http://schemas.microsoft.com/office/drawing/2014/main" id="{A619E86B-133B-8A44-B900-55144E0760D1}"/>
+              </a:ext>
+            </a:extLst>
+          </p:cNvPr>
+          <p:cNvSpPr txBox="1"/>
+          <p:nvPr/>
+        </p:nvSpPr>
+        <p:spPr>
+          <a:xfrm>
+            <a:off x="3495605" y="2584286"/>
+            <a:ext cx="5233737" cy="369332"/>
+          </a:xfrm>
+          <a:prstGeom prst="rect">
+            <a:avLst/>
+          </a:prstGeom>
+          <a:noFill/>
+          <a:ln>
+            <a:solidFill>
+              <a:schemeClr val="accent1"/>
+            </a:solidFill>
+          </a:ln>
+        </p:spPr>
+        <p:txBody>
+          <a:bodyPr wrap="square" rtlCol="0">
+            <a:spAutoFit/>
+          </a:bodyPr>
+          <a:lstStyle/>
+          <a:p>
+            <a:pPr algn="ctr"/>
+            <a:r>
+              <a:rPr lang="en-US" dirty="0"/>
+              <a:t>Docker Container</a:t>
             </a:r>
           </a:p>
         </p:txBody>

</xml_diff>

<commit_message>
adds tech stack to readme. Adds training notebook
</commit_message>
<xml_diff>
--- a/graphics.pptx
+++ b/graphics.pptx
@@ -199,7 +199,7 @@
           <a:p>
             <a:fld id="{6C76CFF4-2948-0547-AFB4-6ADDECDCB85E}" type="datetimeFigureOut">
               <a:rPr lang="en-US" smtClean="0"/>
-              <a:t>10/11/21</a:t>
+              <a:t>10/12/21</a:t>
             </a:fld>
             <a:endParaRPr lang="en-US"/>
           </a:p>
@@ -764,7 +764,7 @@
           <a:p>
             <a:fld id="{E86CA716-4487-0A44-A078-5EC6A25390E0}" type="datetimeFigureOut">
               <a:rPr lang="en-US" smtClean="0"/>
-              <a:t>10/11/21</a:t>
+              <a:t>10/12/21</a:t>
             </a:fld>
             <a:endParaRPr lang="en-US"/>
           </a:p>
@@ -962,7 +962,7 @@
           <a:p>
             <a:fld id="{E86CA716-4487-0A44-A078-5EC6A25390E0}" type="datetimeFigureOut">
               <a:rPr lang="en-US" smtClean="0"/>
-              <a:t>10/11/21</a:t>
+              <a:t>10/12/21</a:t>
             </a:fld>
             <a:endParaRPr lang="en-US"/>
           </a:p>
@@ -1170,7 +1170,7 @@
           <a:p>
             <a:fld id="{E86CA716-4487-0A44-A078-5EC6A25390E0}" type="datetimeFigureOut">
               <a:rPr lang="en-US" smtClean="0"/>
-              <a:t>10/11/21</a:t>
+              <a:t>10/12/21</a:t>
             </a:fld>
             <a:endParaRPr lang="en-US"/>
           </a:p>
@@ -1368,7 +1368,7 @@
           <a:p>
             <a:fld id="{E86CA716-4487-0A44-A078-5EC6A25390E0}" type="datetimeFigureOut">
               <a:rPr lang="en-US" smtClean="0"/>
-              <a:t>10/11/21</a:t>
+              <a:t>10/12/21</a:t>
             </a:fld>
             <a:endParaRPr lang="en-US"/>
           </a:p>
@@ -1643,7 +1643,7 @@
           <a:p>
             <a:fld id="{E86CA716-4487-0A44-A078-5EC6A25390E0}" type="datetimeFigureOut">
               <a:rPr lang="en-US" smtClean="0"/>
-              <a:t>10/11/21</a:t>
+              <a:t>10/12/21</a:t>
             </a:fld>
             <a:endParaRPr lang="en-US"/>
           </a:p>
@@ -1908,7 +1908,7 @@
           <a:p>
             <a:fld id="{E86CA716-4487-0A44-A078-5EC6A25390E0}" type="datetimeFigureOut">
               <a:rPr lang="en-US" smtClean="0"/>
-              <a:t>10/11/21</a:t>
+              <a:t>10/12/21</a:t>
             </a:fld>
             <a:endParaRPr lang="en-US"/>
           </a:p>
@@ -2320,7 +2320,7 @@
           <a:p>
             <a:fld id="{E86CA716-4487-0A44-A078-5EC6A25390E0}" type="datetimeFigureOut">
               <a:rPr lang="en-US" smtClean="0"/>
-              <a:t>10/11/21</a:t>
+              <a:t>10/12/21</a:t>
             </a:fld>
             <a:endParaRPr lang="en-US"/>
           </a:p>
@@ -2461,7 +2461,7 @@
           <a:p>
             <a:fld id="{E86CA716-4487-0A44-A078-5EC6A25390E0}" type="datetimeFigureOut">
               <a:rPr lang="en-US" smtClean="0"/>
-              <a:t>10/11/21</a:t>
+              <a:t>10/12/21</a:t>
             </a:fld>
             <a:endParaRPr lang="en-US"/>
           </a:p>
@@ -2574,7 +2574,7 @@
           <a:p>
             <a:fld id="{E86CA716-4487-0A44-A078-5EC6A25390E0}" type="datetimeFigureOut">
               <a:rPr lang="en-US" smtClean="0"/>
-              <a:t>10/11/21</a:t>
+              <a:t>10/12/21</a:t>
             </a:fld>
             <a:endParaRPr lang="en-US"/>
           </a:p>
@@ -2885,7 +2885,7 @@
           <a:p>
             <a:fld id="{E86CA716-4487-0A44-A078-5EC6A25390E0}" type="datetimeFigureOut">
               <a:rPr lang="en-US" smtClean="0"/>
-              <a:t>10/11/21</a:t>
+              <a:t>10/12/21</a:t>
             </a:fld>
             <a:endParaRPr lang="en-US"/>
           </a:p>
@@ -3173,7 +3173,7 @@
           <a:p>
             <a:fld id="{E86CA716-4487-0A44-A078-5EC6A25390E0}" type="datetimeFigureOut">
               <a:rPr lang="en-US" smtClean="0"/>
-              <a:t>10/11/21</a:t>
+              <a:t>10/12/21</a:t>
             </a:fld>
             <a:endParaRPr lang="en-US"/>
           </a:p>
@@ -3414,7 +3414,7 @@
           <a:p>
             <a:fld id="{E86CA716-4487-0A44-A078-5EC6A25390E0}" type="datetimeFigureOut">
               <a:rPr lang="en-US" smtClean="0"/>
-              <a:t>10/11/21</a:t>
+              <a:t>10/12/21</a:t>
             </a:fld>
             <a:endParaRPr lang="en-US"/>
           </a:p>
@@ -4352,24 +4352,26 @@
         </p:nvSpPr>
         <p:spPr>
           <a:xfrm>
-            <a:off x="1747831" y="105109"/>
-            <a:ext cx="3915032" cy="645726"/>
-          </a:xfrm>
-        </p:spPr>
-        <p:txBody>
-          <a:bodyPr/>
+            <a:off x="1747830" y="162365"/>
+            <a:ext cx="3052769" cy="645726"/>
+          </a:xfrm>
+        </p:spPr>
+        <p:txBody>
+          <a:bodyPr>
+            <a:normAutofit/>
+          </a:bodyPr>
           <a:lstStyle/>
           <a:p>
             <a:pPr marL="0" indent="0">
               <a:buNone/>
             </a:pPr>
             <a:r>
-              <a:rPr lang="en-US" i="1" dirty="0">
+              <a:rPr lang="en-US" sz="2000" i="1" dirty="0">
                 <a:latin typeface="Candara" panose="020E0502030303020204" pitchFamily="34" charset="0"/>
                 <a:ea typeface="Ayuthaya" pitchFamily="2" charset="-34"/>
                 <a:cs typeface="APPLE CHANCERY" panose="03020702040506060504" pitchFamily="66" charset="-79"/>
               </a:rPr>
-              <a:t>Donut or Not?</a:t>
+              <a:t>Donut or Not? – tech stack</a:t>
             </a:r>
           </a:p>
         </p:txBody>
@@ -4444,8 +4446,8 @@
         </p:blipFill>
         <p:spPr bwMode="auto">
           <a:xfrm>
-            <a:off x="2785950" y="1840210"/>
-            <a:ext cx="576135" cy="576135"/>
+            <a:off x="2402200" y="1840210"/>
+            <a:ext cx="494870" cy="494870"/>
           </a:xfrm>
           <a:prstGeom prst="rect">
             <a:avLst/>
@@ -4598,16 +4600,14 @@
         <p:spPr>
           <a:xfrm>
             <a:off x="3495605" y="2584286"/>
-            <a:ext cx="5233737" cy="369332"/>
+            <a:ext cx="4896242" cy="246221"/>
           </a:xfrm>
           <a:prstGeom prst="rect">
             <a:avLst/>
           </a:prstGeom>
           <a:noFill/>
           <a:ln>
-            <a:solidFill>
-              <a:schemeClr val="accent1"/>
-            </a:solidFill>
+            <a:noFill/>
           </a:ln>
         </p:spPr>
         <p:txBody>
@@ -4616,10 +4616,985 @@
           </a:bodyPr>
           <a:lstStyle/>
           <a:p>
+            <a:r>
+              <a:rPr lang="en-US" sz="1000" dirty="0"/>
+              <a:t>Docker Container</a:t>
+            </a:r>
+          </a:p>
+        </p:txBody>
+      </p:sp>
+      <p:sp>
+        <p:nvSpPr>
+          <p:cNvPr id="4" name="Rectangle 3">
+            <a:extLst>
+              <a:ext uri="{FF2B5EF4-FFF2-40B4-BE49-F238E27FC236}">
+                <a16:creationId xmlns:a16="http://schemas.microsoft.com/office/drawing/2014/main" id="{26892633-2CB5-6E4D-90A0-0FA0C3AD5199}"/>
+              </a:ext>
+            </a:extLst>
+          </p:cNvPr>
+          <p:cNvSpPr/>
+          <p:nvPr/>
+        </p:nvSpPr>
+        <p:spPr>
+          <a:xfrm>
+            <a:off x="3495605" y="2584286"/>
+            <a:ext cx="5233737" cy="3251030"/>
+          </a:xfrm>
+          <a:prstGeom prst="rect">
+            <a:avLst/>
+          </a:prstGeom>
+          <a:noFill/>
+          <a:ln>
+            <a:prstDash val="dash"/>
+          </a:ln>
+        </p:spPr>
+        <p:style>
+          <a:lnRef idx="2">
+            <a:schemeClr val="accent1">
+              <a:shade val="50000"/>
+            </a:schemeClr>
+          </a:lnRef>
+          <a:fillRef idx="1">
+            <a:schemeClr val="accent1"/>
+          </a:fillRef>
+          <a:effectRef idx="0">
+            <a:schemeClr val="accent1"/>
+          </a:effectRef>
+          <a:fontRef idx="minor">
+            <a:schemeClr val="lt1"/>
+          </a:fontRef>
+        </p:style>
+        <p:txBody>
+          <a:bodyPr rtlCol="0" anchor="ctr"/>
+          <a:lstStyle/>
+          <a:p>
             <a:pPr algn="ctr"/>
-            <a:r>
-              <a:rPr lang="en-US" dirty="0"/>
-              <a:t>Docker Container</a:t>
+            <a:endParaRPr lang="en-US" dirty="0"/>
+          </a:p>
+        </p:txBody>
+      </p:sp>
+      <p:sp>
+        <p:nvSpPr>
+          <p:cNvPr id="10" name="Rectangle 9">
+            <a:extLst>
+              <a:ext uri="{FF2B5EF4-FFF2-40B4-BE49-F238E27FC236}">
+                <a16:creationId xmlns:a16="http://schemas.microsoft.com/office/drawing/2014/main" id="{60AF08DF-ECC9-FE41-9510-9E522F63EC00}"/>
+              </a:ext>
+            </a:extLst>
+          </p:cNvPr>
+          <p:cNvSpPr/>
+          <p:nvPr/>
+        </p:nvSpPr>
+        <p:spPr>
+          <a:xfrm>
+            <a:off x="3816626" y="2922105"/>
+            <a:ext cx="4896242" cy="2913212"/>
+          </a:xfrm>
+          <a:prstGeom prst="rect">
+            <a:avLst/>
+          </a:prstGeom>
+          <a:noFill/>
+          <a:ln>
+            <a:prstDash val="dash"/>
+          </a:ln>
+        </p:spPr>
+        <p:style>
+          <a:lnRef idx="2">
+            <a:schemeClr val="accent1">
+              <a:shade val="50000"/>
+            </a:schemeClr>
+          </a:lnRef>
+          <a:fillRef idx="1">
+            <a:schemeClr val="accent1"/>
+          </a:fillRef>
+          <a:effectRef idx="0">
+            <a:schemeClr val="accent1"/>
+          </a:effectRef>
+          <a:fontRef idx="minor">
+            <a:schemeClr val="lt1"/>
+          </a:fontRef>
+        </p:style>
+        <p:txBody>
+          <a:bodyPr rtlCol="0" anchor="ctr"/>
+          <a:lstStyle/>
+          <a:p>
+            <a:pPr algn="ctr"/>
+            <a:endParaRPr lang="en-US" dirty="0"/>
+          </a:p>
+        </p:txBody>
+      </p:sp>
+      <p:sp>
+        <p:nvSpPr>
+          <p:cNvPr id="12" name="TextBox 11">
+            <a:extLst>
+              <a:ext uri="{FF2B5EF4-FFF2-40B4-BE49-F238E27FC236}">
+                <a16:creationId xmlns:a16="http://schemas.microsoft.com/office/drawing/2014/main" id="{4304F739-2EC5-184F-9EEC-2B1BEBBEE139}"/>
+              </a:ext>
+            </a:extLst>
+          </p:cNvPr>
+          <p:cNvSpPr txBox="1"/>
+          <p:nvPr/>
+        </p:nvSpPr>
+        <p:spPr>
+          <a:xfrm>
+            <a:off x="3816626" y="2922105"/>
+            <a:ext cx="1510748" cy="246221"/>
+          </a:xfrm>
+          <a:prstGeom prst="rect">
+            <a:avLst/>
+          </a:prstGeom>
+          <a:noFill/>
+          <a:ln>
+            <a:noFill/>
+          </a:ln>
+        </p:spPr>
+        <p:txBody>
+          <a:bodyPr wrap="square" rtlCol="0">
+            <a:spAutoFit/>
+          </a:bodyPr>
+          <a:lstStyle/>
+          <a:p>
+            <a:r>
+              <a:rPr lang="en-US" sz="1000" dirty="0"/>
+              <a:t>Mangum encapsulation</a:t>
+            </a:r>
+          </a:p>
+        </p:txBody>
+      </p:sp>
+      <p:sp>
+        <p:nvSpPr>
+          <p:cNvPr id="13" name="Rectangle 12">
+            <a:extLst>
+              <a:ext uri="{FF2B5EF4-FFF2-40B4-BE49-F238E27FC236}">
+                <a16:creationId xmlns:a16="http://schemas.microsoft.com/office/drawing/2014/main" id="{F9F47FDB-B8BD-C04A-92C6-A8A69527A3B0}"/>
+              </a:ext>
+            </a:extLst>
+          </p:cNvPr>
+          <p:cNvSpPr/>
+          <p:nvPr/>
+        </p:nvSpPr>
+        <p:spPr>
+          <a:xfrm>
+            <a:off x="4093437" y="3371994"/>
+            <a:ext cx="4619431" cy="2463322"/>
+          </a:xfrm>
+          <a:prstGeom prst="rect">
+            <a:avLst/>
+          </a:prstGeom>
+          <a:noFill/>
+          <a:ln>
+            <a:prstDash val="dash"/>
+          </a:ln>
+        </p:spPr>
+        <p:style>
+          <a:lnRef idx="2">
+            <a:schemeClr val="accent1">
+              <a:shade val="50000"/>
+            </a:schemeClr>
+          </a:lnRef>
+          <a:fillRef idx="1">
+            <a:schemeClr val="accent1"/>
+          </a:fillRef>
+          <a:effectRef idx="0">
+            <a:schemeClr val="accent1"/>
+          </a:effectRef>
+          <a:fontRef idx="minor">
+            <a:schemeClr val="lt1"/>
+          </a:fontRef>
+        </p:style>
+        <p:txBody>
+          <a:bodyPr rtlCol="0" anchor="ctr"/>
+          <a:lstStyle/>
+          <a:p>
+            <a:pPr algn="ctr"/>
+            <a:endParaRPr lang="en-US" dirty="0"/>
+          </a:p>
+        </p:txBody>
+      </p:sp>
+      <p:sp>
+        <p:nvSpPr>
+          <p:cNvPr id="14" name="TextBox 13">
+            <a:extLst>
+              <a:ext uri="{FF2B5EF4-FFF2-40B4-BE49-F238E27FC236}">
+                <a16:creationId xmlns:a16="http://schemas.microsoft.com/office/drawing/2014/main" id="{C9020455-3C41-1D45-A2FD-7DCE22A6DCD0}"/>
+              </a:ext>
+            </a:extLst>
+          </p:cNvPr>
+          <p:cNvSpPr txBox="1"/>
+          <p:nvPr/>
+        </p:nvSpPr>
+        <p:spPr>
+          <a:xfrm>
+            <a:off x="4076963" y="3378080"/>
+            <a:ext cx="1510748" cy="246221"/>
+          </a:xfrm>
+          <a:prstGeom prst="rect">
+            <a:avLst/>
+          </a:prstGeom>
+          <a:noFill/>
+          <a:ln>
+            <a:noFill/>
+          </a:ln>
+        </p:spPr>
+        <p:txBody>
+          <a:bodyPr wrap="square" rtlCol="0">
+            <a:spAutoFit/>
+          </a:bodyPr>
+          <a:lstStyle/>
+          <a:p>
+            <a:r>
+              <a:rPr lang="en-US" sz="1000" dirty="0" err="1"/>
+              <a:t>FastAPI</a:t>
+            </a:r>
+            <a:r>
+              <a:rPr lang="en-US" sz="1000" dirty="0"/>
+              <a:t> server</a:t>
+            </a:r>
+          </a:p>
+        </p:txBody>
+      </p:sp>
+      <p:sp>
+        <p:nvSpPr>
+          <p:cNvPr id="15" name="TextBox 14">
+            <a:extLst>
+              <a:ext uri="{FF2B5EF4-FFF2-40B4-BE49-F238E27FC236}">
+                <a16:creationId xmlns:a16="http://schemas.microsoft.com/office/drawing/2014/main" id="{0FBD0B2A-E2AB-914F-9DFC-41DC804F0603}"/>
+              </a:ext>
+            </a:extLst>
+          </p:cNvPr>
+          <p:cNvSpPr txBox="1"/>
+          <p:nvPr/>
+        </p:nvSpPr>
+        <p:spPr>
+          <a:xfrm>
+            <a:off x="5509373" y="3703139"/>
+            <a:ext cx="1905218" cy="1938992"/>
+          </a:xfrm>
+          <a:prstGeom prst="rect">
+            <a:avLst/>
+          </a:prstGeom>
+          <a:noFill/>
+          <a:ln>
+            <a:noFill/>
+          </a:ln>
+        </p:spPr>
+        <p:txBody>
+          <a:bodyPr wrap="square" rtlCol="0">
+            <a:spAutoFit/>
+          </a:bodyPr>
+          <a:lstStyle/>
+          <a:p>
+            <a:pPr algn="ctr"/>
+            <a:r>
+              <a:rPr lang="en-US" sz="1000" dirty="0"/>
+              <a:t>Donut Or Not service</a:t>
+            </a:r>
+          </a:p>
+          <a:p>
+            <a:endParaRPr lang="en-US" sz="1000" dirty="0"/>
+          </a:p>
+          <a:p>
+            <a:pPr marL="171450" indent="-171450">
+              <a:buFontTx/>
+              <a:buChar char="-"/>
+            </a:pPr>
+            <a:r>
+              <a:rPr lang="en-US" sz="1000" dirty="0"/>
+              <a:t>/ </a:t>
+            </a:r>
+            <a:r>
+              <a:rPr lang="en-US" sz="1000" dirty="0">
+                <a:sym typeface="Wingdings" pitchFamily="2" charset="2"/>
+              </a:rPr>
+              <a:t> </a:t>
+            </a:r>
+            <a:r>
+              <a:rPr lang="en-US" sz="1000" dirty="0" err="1">
+                <a:sym typeface="Wingdings" pitchFamily="2" charset="2"/>
+              </a:rPr>
+              <a:t>index.html</a:t>
+            </a:r>
+            <a:endParaRPr lang="en-US" sz="1000" dirty="0">
+              <a:sym typeface="Wingdings" pitchFamily="2" charset="2"/>
+            </a:endParaRPr>
+          </a:p>
+          <a:p>
+            <a:pPr marL="171450" indent="-171450">
+              <a:buFontTx/>
+              <a:buChar char="-"/>
+            </a:pPr>
+            <a:r>
+              <a:rPr lang="en-US" sz="1000" dirty="0">
+                <a:sym typeface="Wingdings" pitchFamily="2" charset="2"/>
+              </a:rPr>
+              <a:t>/</a:t>
+            </a:r>
+            <a:r>
+              <a:rPr lang="en-US" sz="1000" dirty="0" err="1">
+                <a:sym typeface="Wingdings" pitchFamily="2" charset="2"/>
+              </a:rPr>
+              <a:t>classifyImg</a:t>
+            </a:r>
+            <a:r>
+              <a:rPr lang="en-US" sz="1000" dirty="0">
+                <a:sym typeface="Wingdings" pitchFamily="2" charset="2"/>
+              </a:rPr>
+              <a:t>  </a:t>
+            </a:r>
+            <a:r>
+              <a:rPr lang="en-US" sz="1000" dirty="0" err="1">
+                <a:sym typeface="Wingdings" pitchFamily="2" charset="2"/>
+              </a:rPr>
+              <a:t>response.html</a:t>
+            </a:r>
+            <a:endParaRPr lang="en-US" sz="1000" dirty="0">
+              <a:sym typeface="Wingdings" pitchFamily="2" charset="2"/>
+            </a:endParaRPr>
+          </a:p>
+          <a:p>
+            <a:pPr marL="171450" indent="-171450">
+              <a:buFontTx/>
+              <a:buChar char="-"/>
+            </a:pPr>
+            <a:r>
+              <a:rPr lang="en-US" sz="1000" dirty="0">
+                <a:sym typeface="Wingdings" pitchFamily="2" charset="2"/>
+              </a:rPr>
+              <a:t>/</a:t>
+            </a:r>
+            <a:r>
+              <a:rPr lang="en-US" sz="1000" dirty="0" err="1">
+                <a:sym typeface="Wingdings" pitchFamily="2" charset="2"/>
+              </a:rPr>
+              <a:t>listImgFiles</a:t>
+            </a:r>
+            <a:r>
+              <a:rPr lang="en-US" sz="1000" dirty="0">
+                <a:sym typeface="Wingdings" pitchFamily="2" charset="2"/>
+              </a:rPr>
+              <a:t>  json</a:t>
+            </a:r>
+          </a:p>
+          <a:p>
+            <a:pPr marL="171450" indent="-171450">
+              <a:buFontTx/>
+              <a:buChar char="-"/>
+            </a:pPr>
+            <a:r>
+              <a:rPr lang="en-US" sz="1000" dirty="0">
+                <a:sym typeface="Wingdings" pitchFamily="2" charset="2"/>
+              </a:rPr>
+              <a:t>/</a:t>
+            </a:r>
+            <a:r>
+              <a:rPr lang="en-US" sz="1000" dirty="0" err="1">
+                <a:sym typeface="Wingdings" pitchFamily="2" charset="2"/>
+              </a:rPr>
+              <a:t>getTimestamp</a:t>
+            </a:r>
+            <a:r>
+              <a:rPr lang="en-US" sz="1000" dirty="0">
+                <a:sym typeface="Wingdings" pitchFamily="2" charset="2"/>
+              </a:rPr>
+              <a:t>  str</a:t>
+            </a:r>
+          </a:p>
+          <a:p>
+            <a:pPr marL="171450" indent="-171450">
+              <a:buFontTx/>
+              <a:buChar char="-"/>
+            </a:pPr>
+            <a:r>
+              <a:rPr lang="en-US" sz="1000" dirty="0">
+                <a:sym typeface="Wingdings" pitchFamily="2" charset="2"/>
+              </a:rPr>
+              <a:t>/hello  json</a:t>
+            </a:r>
+          </a:p>
+          <a:p>
+            <a:pPr marL="171450" indent="-171450">
+              <a:buFontTx/>
+              <a:buChar char="-"/>
+            </a:pPr>
+            <a:endParaRPr lang="en-US" sz="1000" dirty="0">
+              <a:sym typeface="Wingdings" pitchFamily="2" charset="2"/>
+            </a:endParaRPr>
+          </a:p>
+          <a:p>
+            <a:r>
+              <a:rPr lang="en-US" sz="1000" dirty="0">
+                <a:sym typeface="Wingdings" pitchFamily="2" charset="2"/>
+              </a:rPr>
+              <a:t>Resource files</a:t>
+            </a:r>
+          </a:p>
+          <a:p>
+            <a:pPr marL="171450" indent="-171450">
+              <a:buFontTx/>
+              <a:buChar char="-"/>
+            </a:pPr>
+            <a:r>
+              <a:rPr lang="en-US" sz="1000" dirty="0" err="1">
+                <a:sym typeface="Wingdings" pitchFamily="2" charset="2"/>
+              </a:rPr>
+              <a:t>export.pkl</a:t>
+            </a:r>
+            <a:r>
+              <a:rPr lang="en-US" sz="1000" dirty="0">
+                <a:sym typeface="Wingdings" pitchFamily="2" charset="2"/>
+              </a:rPr>
+              <a:t>  </a:t>
+            </a:r>
+            <a:r>
+              <a:rPr lang="en-US" sz="1000" dirty="0" err="1">
+                <a:sym typeface="Wingdings" pitchFamily="2" charset="2"/>
+              </a:rPr>
+              <a:t>PyTorch</a:t>
+            </a:r>
+            <a:r>
+              <a:rPr lang="en-US" sz="1000" dirty="0">
+                <a:sym typeface="Wingdings" pitchFamily="2" charset="2"/>
+              </a:rPr>
+              <a:t> model</a:t>
+            </a:r>
+          </a:p>
+          <a:p>
+            <a:pPr marL="171450" indent="-171450">
+              <a:buFontTx/>
+              <a:buChar char="-"/>
+            </a:pPr>
+            <a:r>
+              <a:rPr lang="en-US" sz="1000" dirty="0" err="1">
+                <a:sym typeface="Wingdings" pitchFamily="2" charset="2"/>
+              </a:rPr>
+              <a:t>favicon.ico</a:t>
+            </a:r>
+            <a:endParaRPr lang="en-US" sz="1000" dirty="0">
+              <a:sym typeface="Wingdings" pitchFamily="2" charset="2"/>
+            </a:endParaRPr>
+          </a:p>
+          <a:p>
+            <a:pPr marL="171450" indent="-171450">
+              <a:buFontTx/>
+              <a:buChar char="-"/>
+            </a:pPr>
+            <a:r>
+              <a:rPr lang="en-US" sz="1000" dirty="0" err="1">
+                <a:sym typeface="Wingdings" pitchFamily="2" charset="2"/>
+              </a:rPr>
+              <a:t>landing_graphics.jpg</a:t>
+            </a:r>
+            <a:endParaRPr lang="en-US" sz="1000" dirty="0"/>
+          </a:p>
+        </p:txBody>
+      </p:sp>
+      <p:pic>
+        <p:nvPicPr>
+          <p:cNvPr id="5" name="Picture 2" descr="【アプリケーション開発者必見!】Amazon ECSでコンテナ化!？ | Skyarch Broadcasting">
+            <a:extLst>
+              <a:ext uri="{FF2B5EF4-FFF2-40B4-BE49-F238E27FC236}">
+                <a16:creationId xmlns:a16="http://schemas.microsoft.com/office/drawing/2014/main" id="{C9BCE7C4-5FA3-8943-AAB3-16020F0C2476}"/>
+              </a:ext>
+            </a:extLst>
+          </p:cNvPr>
+          <p:cNvPicPr>
+            <a:picLocks noChangeAspect="1" noChangeArrowheads="1"/>
+          </p:cNvPicPr>
+          <p:nvPr/>
+        </p:nvPicPr>
+        <p:blipFill>
+          <a:blip r:embed="rId3">
+            <a:extLst>
+              <a:ext uri="{28A0092B-C50C-407E-A947-70E740481C1C}">
+                <a14:useLocalDpi xmlns:a14="http://schemas.microsoft.com/office/drawing/2010/main" val="0"/>
+              </a:ext>
+            </a:extLst>
+          </a:blip>
+          <a:srcRect/>
+          <a:stretch>
+            <a:fillRect/>
+          </a:stretch>
+        </p:blipFill>
+        <p:spPr bwMode="auto">
+          <a:xfrm>
+            <a:off x="2446738" y="2491509"/>
+            <a:ext cx="450332" cy="494870"/>
+          </a:xfrm>
+          <a:prstGeom prst="rect">
+            <a:avLst/>
+          </a:prstGeom>
+          <a:noFill/>
+          <a:extLst>
+            <a:ext uri="{909E8E84-426E-40DD-AFC4-6F175D3DCCD1}">
+              <a14:hiddenFill xmlns:a14="http://schemas.microsoft.com/office/drawing/2010/main">
+                <a:solidFill>
+                  <a:srgbClr val="FFFFFF"/>
+                </a:solidFill>
+              </a14:hiddenFill>
+            </a:ext>
+          </a:extLst>
+        </p:spPr>
+      </p:pic>
+      <p:cxnSp>
+        <p:nvCxnSpPr>
+          <p:cNvPr id="16" name="Straight Arrow Connector 15">
+            <a:extLst>
+              <a:ext uri="{FF2B5EF4-FFF2-40B4-BE49-F238E27FC236}">
+                <a16:creationId xmlns:a16="http://schemas.microsoft.com/office/drawing/2014/main" id="{FBF45861-B998-F84B-8E17-0D330CCE462E}"/>
+              </a:ext>
+            </a:extLst>
+          </p:cNvPr>
+          <p:cNvCxnSpPr>
+            <a:cxnSpLocks/>
+          </p:cNvCxnSpPr>
+          <p:nvPr/>
+        </p:nvCxnSpPr>
+        <p:spPr>
+          <a:xfrm>
+            <a:off x="2897070" y="2106141"/>
+            <a:ext cx="506718" cy="0"/>
+          </a:xfrm>
+          <a:prstGeom prst="straightConnector1">
+            <a:avLst/>
+          </a:prstGeom>
+          <a:ln>
+            <a:tailEnd type="triangle"/>
+          </a:ln>
+        </p:spPr>
+        <p:style>
+          <a:lnRef idx="1">
+            <a:schemeClr val="accent1"/>
+          </a:lnRef>
+          <a:fillRef idx="0">
+            <a:schemeClr val="accent1"/>
+          </a:fillRef>
+          <a:effectRef idx="0">
+            <a:schemeClr val="accent1"/>
+          </a:effectRef>
+          <a:fontRef idx="minor">
+            <a:schemeClr val="tx1"/>
+          </a:fontRef>
+        </p:style>
+      </p:cxnSp>
+      <p:cxnSp>
+        <p:nvCxnSpPr>
+          <p:cNvPr id="18" name="Straight Arrow Connector 17">
+            <a:extLst>
+              <a:ext uri="{FF2B5EF4-FFF2-40B4-BE49-F238E27FC236}">
+                <a16:creationId xmlns:a16="http://schemas.microsoft.com/office/drawing/2014/main" id="{340D9A36-7B16-A947-AB59-DA4D16891DD8}"/>
+              </a:ext>
+            </a:extLst>
+          </p:cNvPr>
+          <p:cNvCxnSpPr>
+            <a:cxnSpLocks/>
+          </p:cNvCxnSpPr>
+          <p:nvPr/>
+        </p:nvCxnSpPr>
+        <p:spPr>
+          <a:xfrm>
+            <a:off x="2897070" y="2707396"/>
+            <a:ext cx="506718" cy="0"/>
+          </a:xfrm>
+          <a:prstGeom prst="straightConnector1">
+            <a:avLst/>
+          </a:prstGeom>
+          <a:ln>
+            <a:tailEnd type="triangle"/>
+          </a:ln>
+        </p:spPr>
+        <p:style>
+          <a:lnRef idx="1">
+            <a:schemeClr val="accent1"/>
+          </a:lnRef>
+          <a:fillRef idx="0">
+            <a:schemeClr val="accent1"/>
+          </a:fillRef>
+          <a:effectRef idx="0">
+            <a:schemeClr val="accent1"/>
+          </a:effectRef>
+          <a:fontRef idx="minor">
+            <a:schemeClr val="tx1"/>
+          </a:fontRef>
+        </p:style>
+      </p:cxnSp>
+      <p:pic>
+        <p:nvPicPr>
+          <p:cNvPr id="17" name="Picture 16">
+            <a:extLst>
+              <a:ext uri="{FF2B5EF4-FFF2-40B4-BE49-F238E27FC236}">
+                <a16:creationId xmlns:a16="http://schemas.microsoft.com/office/drawing/2014/main" id="{376F06C6-15C6-EE44-B5C8-95A911B5FBEE}"/>
+              </a:ext>
+            </a:extLst>
+          </p:cNvPr>
+          <p:cNvPicPr>
+            <a:picLocks noChangeAspect="1"/>
+          </p:cNvPicPr>
+          <p:nvPr/>
+        </p:nvPicPr>
+        <p:blipFill>
+          <a:blip r:embed="rId4"/>
+          <a:stretch>
+            <a:fillRect/>
+          </a:stretch>
+        </p:blipFill>
+        <p:spPr>
+          <a:xfrm>
+            <a:off x="2402200" y="3067351"/>
+            <a:ext cx="450332" cy="380280"/>
+          </a:xfrm>
+          <a:prstGeom prst="rect">
+            <a:avLst/>
+          </a:prstGeom>
+        </p:spPr>
+      </p:pic>
+      <p:cxnSp>
+        <p:nvCxnSpPr>
+          <p:cNvPr id="20" name="Straight Arrow Connector 19">
+            <a:extLst>
+              <a:ext uri="{FF2B5EF4-FFF2-40B4-BE49-F238E27FC236}">
+                <a16:creationId xmlns:a16="http://schemas.microsoft.com/office/drawing/2014/main" id="{005A9451-2882-724B-8049-07A961724EE7}"/>
+              </a:ext>
+            </a:extLst>
+          </p:cNvPr>
+          <p:cNvCxnSpPr>
+            <a:cxnSpLocks/>
+          </p:cNvCxnSpPr>
+          <p:nvPr/>
+        </p:nvCxnSpPr>
+        <p:spPr>
+          <a:xfrm>
+            <a:off x="-4910139" y="1756158"/>
+            <a:ext cx="16068" cy="0"/>
+          </a:xfrm>
+          <a:prstGeom prst="straightConnector1">
+            <a:avLst/>
+          </a:prstGeom>
+          <a:ln>
+            <a:tailEnd type="triangle"/>
+          </a:ln>
+        </p:spPr>
+        <p:style>
+          <a:lnRef idx="1">
+            <a:schemeClr val="accent1"/>
+          </a:lnRef>
+          <a:fillRef idx="0">
+            <a:schemeClr val="accent1"/>
+          </a:fillRef>
+          <a:effectRef idx="0">
+            <a:schemeClr val="accent1"/>
+          </a:effectRef>
+          <a:fontRef idx="minor">
+            <a:schemeClr val="tx1"/>
+          </a:fontRef>
+        </p:style>
+      </p:cxnSp>
+      <p:pic>
+        <p:nvPicPr>
+          <p:cNvPr id="1028" name="Picture 4" descr="Features - Typer">
+            <a:extLst>
+              <a:ext uri="{FF2B5EF4-FFF2-40B4-BE49-F238E27FC236}">
+                <a16:creationId xmlns:a16="http://schemas.microsoft.com/office/drawing/2014/main" id="{002D11D3-FC91-3144-AD3E-AC7AD393C22B}"/>
+              </a:ext>
+            </a:extLst>
+          </p:cNvPr>
+          <p:cNvPicPr>
+            <a:picLocks noChangeAspect="1" noChangeArrowheads="1"/>
+          </p:cNvPicPr>
+          <p:nvPr/>
+        </p:nvPicPr>
+        <p:blipFill>
+          <a:blip r:embed="rId5">
+            <a:extLst>
+              <a:ext uri="{28A0092B-C50C-407E-A947-70E740481C1C}">
+                <a14:useLocalDpi xmlns:a14="http://schemas.microsoft.com/office/drawing/2010/main" val="0"/>
+              </a:ext>
+            </a:extLst>
+          </a:blip>
+          <a:srcRect/>
+          <a:stretch>
+            <a:fillRect/>
+          </a:stretch>
+        </p:blipFill>
+        <p:spPr bwMode="auto">
+          <a:xfrm>
+            <a:off x="2070370" y="3587632"/>
+            <a:ext cx="1054353" cy="380281"/>
+          </a:xfrm>
+          <a:prstGeom prst="rect">
+            <a:avLst/>
+          </a:prstGeom>
+          <a:noFill/>
+          <a:extLst>
+            <a:ext uri="{909E8E84-426E-40DD-AFC4-6F175D3DCCD1}">
+              <a14:hiddenFill xmlns:a14="http://schemas.microsoft.com/office/drawing/2010/main">
+                <a:solidFill>
+                  <a:srgbClr val="FFFFFF"/>
+                </a:solidFill>
+              </a14:hiddenFill>
+            </a:ext>
+          </a:extLst>
+        </p:spPr>
+      </p:pic>
+      <p:cxnSp>
+        <p:nvCxnSpPr>
+          <p:cNvPr id="25" name="Straight Arrow Connector 24">
+            <a:extLst>
+              <a:ext uri="{FF2B5EF4-FFF2-40B4-BE49-F238E27FC236}">
+                <a16:creationId xmlns:a16="http://schemas.microsoft.com/office/drawing/2014/main" id="{868DE06D-DA13-744B-B063-3A2E5BD2DD5B}"/>
+              </a:ext>
+            </a:extLst>
+          </p:cNvPr>
+          <p:cNvCxnSpPr>
+            <a:cxnSpLocks/>
+          </p:cNvCxnSpPr>
+          <p:nvPr/>
+        </p:nvCxnSpPr>
+        <p:spPr>
+          <a:xfrm>
+            <a:off x="2897070" y="3267300"/>
+            <a:ext cx="919556" cy="0"/>
+          </a:xfrm>
+          <a:prstGeom prst="straightConnector1">
+            <a:avLst/>
+          </a:prstGeom>
+          <a:ln>
+            <a:tailEnd type="triangle"/>
+          </a:ln>
+        </p:spPr>
+        <p:style>
+          <a:lnRef idx="1">
+            <a:schemeClr val="accent1"/>
+          </a:lnRef>
+          <a:fillRef idx="0">
+            <a:schemeClr val="accent1"/>
+          </a:fillRef>
+          <a:effectRef idx="0">
+            <a:schemeClr val="accent1"/>
+          </a:effectRef>
+          <a:fontRef idx="minor">
+            <a:schemeClr val="tx1"/>
+          </a:fontRef>
+        </p:style>
+      </p:cxnSp>
+      <p:cxnSp>
+        <p:nvCxnSpPr>
+          <p:cNvPr id="27" name="Straight Arrow Connector 26">
+            <a:extLst>
+              <a:ext uri="{FF2B5EF4-FFF2-40B4-BE49-F238E27FC236}">
+                <a16:creationId xmlns:a16="http://schemas.microsoft.com/office/drawing/2014/main" id="{80818B37-ADBC-BB4A-B2C7-358BA996734A}"/>
+              </a:ext>
+            </a:extLst>
+          </p:cNvPr>
+          <p:cNvCxnSpPr>
+            <a:cxnSpLocks/>
+          </p:cNvCxnSpPr>
+          <p:nvPr/>
+        </p:nvCxnSpPr>
+        <p:spPr>
+          <a:xfrm>
+            <a:off x="3056440" y="3787448"/>
+            <a:ext cx="1020523" cy="0"/>
+          </a:xfrm>
+          <a:prstGeom prst="straightConnector1">
+            <a:avLst/>
+          </a:prstGeom>
+          <a:ln>
+            <a:tailEnd type="triangle"/>
+          </a:ln>
+        </p:spPr>
+        <p:style>
+          <a:lnRef idx="1">
+            <a:schemeClr val="accent1"/>
+          </a:lnRef>
+          <a:fillRef idx="0">
+            <a:schemeClr val="accent1"/>
+          </a:fillRef>
+          <a:effectRef idx="0">
+            <a:schemeClr val="accent1"/>
+          </a:effectRef>
+          <a:fontRef idx="minor">
+            <a:schemeClr val="tx1"/>
+          </a:fontRef>
+        </p:style>
+      </p:cxnSp>
+      <p:pic>
+        <p:nvPicPr>
+          <p:cNvPr id="1030" name="Picture 6" descr="Docker - Logos Download">
+            <a:extLst>
+              <a:ext uri="{FF2B5EF4-FFF2-40B4-BE49-F238E27FC236}">
+                <a16:creationId xmlns:a16="http://schemas.microsoft.com/office/drawing/2014/main" id="{54FF1008-D87E-4D45-8298-F154456CCACD}"/>
+              </a:ext>
+            </a:extLst>
+          </p:cNvPr>
+          <p:cNvPicPr>
+            <a:picLocks noChangeAspect="1" noChangeArrowheads="1"/>
+          </p:cNvPicPr>
+          <p:nvPr/>
+        </p:nvPicPr>
+        <p:blipFill>
+          <a:blip r:embed="rId6">
+            <a:extLst>
+              <a:ext uri="{28A0092B-C50C-407E-A947-70E740481C1C}">
+                <a14:useLocalDpi xmlns:a14="http://schemas.microsoft.com/office/drawing/2010/main" val="0"/>
+              </a:ext>
+            </a:extLst>
+          </a:blip>
+          <a:srcRect/>
+          <a:stretch>
+            <a:fillRect/>
+          </a:stretch>
+        </p:blipFill>
+        <p:spPr bwMode="auto">
+          <a:xfrm>
+            <a:off x="1915780" y="1921475"/>
+            <a:ext cx="390780" cy="327991"/>
+          </a:xfrm>
+          <a:prstGeom prst="rect">
+            <a:avLst/>
+          </a:prstGeom>
+          <a:noFill/>
+          <a:extLst>
+            <a:ext uri="{909E8E84-426E-40DD-AFC4-6F175D3DCCD1}">
+              <a14:hiddenFill xmlns:a14="http://schemas.microsoft.com/office/drawing/2010/main">
+                <a:solidFill>
+                  <a:srgbClr val="FFFFFF"/>
+                </a:solidFill>
+              </a14:hiddenFill>
+            </a:ext>
+          </a:extLst>
+        </p:spPr>
+      </p:pic>
+      <p:pic>
+        <p:nvPicPr>
+          <p:cNvPr id="1032" name="Picture 8" descr="How to Write Your First AWS Lambda Function — Runscope Blog">
+            <a:extLst>
+              <a:ext uri="{FF2B5EF4-FFF2-40B4-BE49-F238E27FC236}">
+                <a16:creationId xmlns:a16="http://schemas.microsoft.com/office/drawing/2014/main" id="{309B1FF2-7017-F94B-B661-0552516263CE}"/>
+              </a:ext>
+            </a:extLst>
+          </p:cNvPr>
+          <p:cNvPicPr>
+            <a:picLocks noChangeAspect="1" noChangeArrowheads="1"/>
+          </p:cNvPicPr>
+          <p:nvPr/>
+        </p:nvPicPr>
+        <p:blipFill>
+          <a:blip r:embed="rId7">
+            <a:extLst>
+              <a:ext uri="{28A0092B-C50C-407E-A947-70E740481C1C}">
+                <a14:useLocalDpi xmlns:a14="http://schemas.microsoft.com/office/drawing/2010/main" val="0"/>
+              </a:ext>
+            </a:extLst>
+          </a:blip>
+          <a:srcRect/>
+          <a:stretch>
+            <a:fillRect/>
+          </a:stretch>
+        </p:blipFill>
+        <p:spPr bwMode="auto">
+          <a:xfrm>
+            <a:off x="9100224" y="5429250"/>
+            <a:ext cx="812132" cy="812132"/>
+          </a:xfrm>
+          <a:prstGeom prst="rect">
+            <a:avLst/>
+          </a:prstGeom>
+          <a:noFill/>
+          <a:extLst>
+            <a:ext uri="{909E8E84-426E-40DD-AFC4-6F175D3DCCD1}">
+              <a14:hiddenFill xmlns:a14="http://schemas.microsoft.com/office/drawing/2010/main">
+                <a:solidFill>
+                  <a:srgbClr val="FFFFFF"/>
+                </a:solidFill>
+              </a14:hiddenFill>
+            </a:ext>
+          </a:extLst>
+        </p:spPr>
+      </p:pic>
+      <p:sp>
+        <p:nvSpPr>
+          <p:cNvPr id="31" name="Rectangle 30">
+            <a:extLst>
+              <a:ext uri="{FF2B5EF4-FFF2-40B4-BE49-F238E27FC236}">
+                <a16:creationId xmlns:a16="http://schemas.microsoft.com/office/drawing/2014/main" id="{65391CE7-8EA9-6647-95D6-5460FE5EB41A}"/>
+              </a:ext>
+            </a:extLst>
+          </p:cNvPr>
+          <p:cNvSpPr/>
+          <p:nvPr/>
+        </p:nvSpPr>
+        <p:spPr>
+          <a:xfrm>
+            <a:off x="1747831" y="1360863"/>
+            <a:ext cx="8240957" cy="4930951"/>
+          </a:xfrm>
+          <a:prstGeom prst="rect">
+            <a:avLst/>
+          </a:prstGeom>
+          <a:noFill/>
+          <a:ln>
+            <a:prstDash val="dash"/>
+          </a:ln>
+        </p:spPr>
+        <p:style>
+          <a:lnRef idx="2">
+            <a:schemeClr val="accent1">
+              <a:shade val="50000"/>
+            </a:schemeClr>
+          </a:lnRef>
+          <a:fillRef idx="1">
+            <a:schemeClr val="accent1"/>
+          </a:fillRef>
+          <a:effectRef idx="0">
+            <a:schemeClr val="accent1"/>
+          </a:effectRef>
+          <a:fontRef idx="minor">
+            <a:schemeClr val="lt1"/>
+          </a:fontRef>
+        </p:style>
+        <p:txBody>
+          <a:bodyPr rtlCol="0" anchor="ctr"/>
+          <a:lstStyle/>
+          <a:p>
+            <a:pPr algn="ctr"/>
+            <a:endParaRPr lang="en-US" dirty="0"/>
+          </a:p>
+        </p:txBody>
+      </p:sp>
+      <p:sp>
+        <p:nvSpPr>
+          <p:cNvPr id="32" name="TextBox 31">
+            <a:extLst>
+              <a:ext uri="{FF2B5EF4-FFF2-40B4-BE49-F238E27FC236}">
+                <a16:creationId xmlns:a16="http://schemas.microsoft.com/office/drawing/2014/main" id="{7C304387-0126-6A46-ACFE-8B1244C1B0E8}"/>
+              </a:ext>
+            </a:extLst>
+          </p:cNvPr>
+          <p:cNvSpPr txBox="1"/>
+          <p:nvPr/>
+        </p:nvSpPr>
+        <p:spPr>
+          <a:xfrm>
+            <a:off x="7975715" y="5995161"/>
+            <a:ext cx="1474305" cy="246221"/>
+          </a:xfrm>
+          <a:prstGeom prst="rect">
+            <a:avLst/>
+          </a:prstGeom>
+          <a:noFill/>
+          <a:ln>
+            <a:noFill/>
+          </a:ln>
+        </p:spPr>
+        <p:txBody>
+          <a:bodyPr wrap="square" rtlCol="0">
+            <a:spAutoFit/>
+          </a:bodyPr>
+          <a:lstStyle/>
+          <a:p>
+            <a:r>
+              <a:rPr lang="en-US" sz="1000" dirty="0"/>
+              <a:t>AWS Lambda service</a:t>
             </a:r>
           </a:p>
         </p:txBody>

</xml_diff>